<commit_message>
Added link to YouTube video to presentation
</commit_message>
<xml_diff>
--- a/9--Survival_Analysis/Survival_Analysis_For_Hospital_LOS_Prediction_For_CoViD-19_Patients.pptx
+++ b/9--Survival_Analysis/Survival_Analysis_For_Hospital_LOS_Prediction_For_CoViD-19_Patients.pptx
@@ -128,7 +128,7 @@
 
 <file path=ppt/commentAuthors.xml><?xml version="1.0" encoding="utf-8"?>
 <p:cmAuthorLst xmlns:a="http://schemas.openxmlformats.org/drawingml/2006/main" xmlns:r="http://schemas.openxmlformats.org/officeDocument/2006/relationships" xmlns:p="http://schemas.openxmlformats.org/presentationml/2006/main">
-  <p:cmAuthor id="1" name="Tom Lever" initials="TL" lastIdx="1" clrIdx="0">
+  <p:cmAuthor id="1" name="Tom Lever" initials="TL" lastIdx="2" clrIdx="0">
     <p:extLst>
       <p:ext uri="{19B8F6BF-5375-455C-9EA6-DF929625EA0E}">
         <p15:presenceInfo xmlns:p15="http://schemas.microsoft.com/office/powerpoint/2012/main" userId="2f93857e077ad104" providerId="Windows Live"/>
@@ -136,6 +136,20 @@
     </p:extLst>
   </p:cmAuthor>
 </p:cmAuthorLst>
+</file>
+
+<file path=ppt/comments/comment1.xml><?xml version="1.0" encoding="utf-8"?>
+<p:cmLst xmlns:a="http://schemas.openxmlformats.org/drawingml/2006/main" xmlns:r="http://schemas.openxmlformats.org/officeDocument/2006/relationships" xmlns:p="http://schemas.openxmlformats.org/presentationml/2006/main">
+  <p:cm authorId="1" dt="2024-10-19T02:12:42.663" idx="2">
+    <p:pos x="10" y="10"/>
+    <p:text>https://www.youtube.com/watch?v=PjYQt71666g</p:text>
+    <p:extLst>
+      <p:ext uri="{C676402C-5697-4E1C-873F-D02D1690AC5C}">
+        <p15:threadingInfo xmlns:p15="http://schemas.microsoft.com/office/powerpoint/2012/main" timeZoneBias="240"/>
+      </p:ext>
+    </p:extLst>
+  </p:cm>
+</p:cmLst>
 </file>
 
 <file path=ppt/notesMasters/notesMaster1.xml><?xml version="1.0" encoding="utf-8"?>

</xml_diff>